<commit_message>
final(probably not) conceptual model
</commit_message>
<xml_diff>
--- a/phase1/Modelo conceptual.pptx
+++ b/phase1/Modelo conceptual.pptx
@@ -104,6 +104,11 @@
       </a:defRPr>
     </a:lvl9pPr>
   </p:defaultTextStyle>
+  <p:extLst>
+    <p:ext uri="{EFAFB233-063F-42B5-8137-9DF3F51BA10A}">
+      <p15:sldGuideLst xmlns:p15="http://schemas.microsoft.com/office/powerpoint/2012/main"/>
+    </p:ext>
+  </p:extLst>
 </p:presentation>
 </file>
 
@@ -256,7 +261,7 @@
               <a:rPr lang="pt-PT" smtClean="0"/>
               <a:t>04/10/2022</a:t>
             </a:fld>
-            <a:endParaRPr lang="pt-PT"/>
+            <a:endParaRPr lang="pt-PT" dirty="0"/>
           </a:p>
         </p:txBody>
       </p:sp>
@@ -281,7 +286,7 @@
           <a:bodyPr/>
           <a:lstStyle/>
           <a:p>
-            <a:endParaRPr lang="pt-PT"/>
+            <a:endParaRPr lang="pt-PT" dirty="0"/>
           </a:p>
         </p:txBody>
       </p:sp>
@@ -310,7 +315,7 @@
               <a:rPr lang="pt-PT" smtClean="0"/>
               <a:t>‹nº›</a:t>
             </a:fld>
-            <a:endParaRPr lang="pt-PT"/>
+            <a:endParaRPr lang="pt-PT" dirty="0"/>
           </a:p>
         </p:txBody>
       </p:sp>
@@ -454,7 +459,7 @@
               <a:rPr lang="pt-PT" smtClean="0"/>
               <a:t>04/10/2022</a:t>
             </a:fld>
-            <a:endParaRPr lang="pt-PT"/>
+            <a:endParaRPr lang="pt-PT" dirty="0"/>
           </a:p>
         </p:txBody>
       </p:sp>
@@ -479,7 +484,7 @@
           <a:bodyPr/>
           <a:lstStyle/>
           <a:p>
-            <a:endParaRPr lang="pt-PT"/>
+            <a:endParaRPr lang="pt-PT" dirty="0"/>
           </a:p>
         </p:txBody>
       </p:sp>
@@ -508,7 +513,7 @@
               <a:rPr lang="pt-PT" smtClean="0"/>
               <a:t>‹nº›</a:t>
             </a:fld>
-            <a:endParaRPr lang="pt-PT"/>
+            <a:endParaRPr lang="pt-PT" dirty="0"/>
           </a:p>
         </p:txBody>
       </p:sp>
@@ -662,7 +667,7 @@
               <a:rPr lang="pt-PT" smtClean="0"/>
               <a:t>04/10/2022</a:t>
             </a:fld>
-            <a:endParaRPr lang="pt-PT"/>
+            <a:endParaRPr lang="pt-PT" dirty="0"/>
           </a:p>
         </p:txBody>
       </p:sp>
@@ -687,7 +692,7 @@
           <a:bodyPr/>
           <a:lstStyle/>
           <a:p>
-            <a:endParaRPr lang="pt-PT"/>
+            <a:endParaRPr lang="pt-PT" dirty="0"/>
           </a:p>
         </p:txBody>
       </p:sp>
@@ -716,7 +721,7 @@
               <a:rPr lang="pt-PT" smtClean="0"/>
               <a:t>‹nº›</a:t>
             </a:fld>
-            <a:endParaRPr lang="pt-PT"/>
+            <a:endParaRPr lang="pt-PT" dirty="0"/>
           </a:p>
         </p:txBody>
       </p:sp>
@@ -860,7 +865,7 @@
               <a:rPr lang="pt-PT" smtClean="0"/>
               <a:t>04/10/2022</a:t>
             </a:fld>
-            <a:endParaRPr lang="pt-PT"/>
+            <a:endParaRPr lang="pt-PT" dirty="0"/>
           </a:p>
         </p:txBody>
       </p:sp>
@@ -885,7 +890,7 @@
           <a:bodyPr/>
           <a:lstStyle/>
           <a:p>
-            <a:endParaRPr lang="pt-PT"/>
+            <a:endParaRPr lang="pt-PT" dirty="0"/>
           </a:p>
         </p:txBody>
       </p:sp>
@@ -914,7 +919,7 @@
               <a:rPr lang="pt-PT" smtClean="0"/>
               <a:t>‹nº›</a:t>
             </a:fld>
-            <a:endParaRPr lang="pt-PT"/>
+            <a:endParaRPr lang="pt-PT" dirty="0"/>
           </a:p>
         </p:txBody>
       </p:sp>
@@ -1135,7 +1140,7 @@
               <a:rPr lang="pt-PT" smtClean="0"/>
               <a:t>04/10/2022</a:t>
             </a:fld>
-            <a:endParaRPr lang="pt-PT"/>
+            <a:endParaRPr lang="pt-PT" dirty="0"/>
           </a:p>
         </p:txBody>
       </p:sp>
@@ -1160,7 +1165,7 @@
           <a:bodyPr/>
           <a:lstStyle/>
           <a:p>
-            <a:endParaRPr lang="pt-PT"/>
+            <a:endParaRPr lang="pt-PT" dirty="0"/>
           </a:p>
         </p:txBody>
       </p:sp>
@@ -1189,7 +1194,7 @@
               <a:rPr lang="pt-PT" smtClean="0"/>
               <a:t>‹nº›</a:t>
             </a:fld>
-            <a:endParaRPr lang="pt-PT"/>
+            <a:endParaRPr lang="pt-PT" dirty="0"/>
           </a:p>
         </p:txBody>
       </p:sp>
@@ -1400,7 +1405,7 @@
               <a:rPr lang="pt-PT" smtClean="0"/>
               <a:t>04/10/2022</a:t>
             </a:fld>
-            <a:endParaRPr lang="pt-PT"/>
+            <a:endParaRPr lang="pt-PT" dirty="0"/>
           </a:p>
         </p:txBody>
       </p:sp>
@@ -1425,7 +1430,7 @@
           <a:bodyPr/>
           <a:lstStyle/>
           <a:p>
-            <a:endParaRPr lang="pt-PT"/>
+            <a:endParaRPr lang="pt-PT" dirty="0"/>
           </a:p>
         </p:txBody>
       </p:sp>
@@ -1454,7 +1459,7 @@
               <a:rPr lang="pt-PT" smtClean="0"/>
               <a:t>‹nº›</a:t>
             </a:fld>
-            <a:endParaRPr lang="pt-PT"/>
+            <a:endParaRPr lang="pt-PT" dirty="0"/>
           </a:p>
         </p:txBody>
       </p:sp>
@@ -1812,7 +1817,7 @@
               <a:rPr lang="pt-PT" smtClean="0"/>
               <a:t>04/10/2022</a:t>
             </a:fld>
-            <a:endParaRPr lang="pt-PT"/>
+            <a:endParaRPr lang="pt-PT" dirty="0"/>
           </a:p>
         </p:txBody>
       </p:sp>
@@ -1837,7 +1842,7 @@
           <a:bodyPr/>
           <a:lstStyle/>
           <a:p>
-            <a:endParaRPr lang="pt-PT"/>
+            <a:endParaRPr lang="pt-PT" dirty="0"/>
           </a:p>
         </p:txBody>
       </p:sp>
@@ -1866,7 +1871,7 @@
               <a:rPr lang="pt-PT" smtClean="0"/>
               <a:t>‹nº›</a:t>
             </a:fld>
-            <a:endParaRPr lang="pt-PT"/>
+            <a:endParaRPr lang="pt-PT" dirty="0"/>
           </a:p>
         </p:txBody>
       </p:sp>
@@ -1953,7 +1958,7 @@
               <a:rPr lang="pt-PT" smtClean="0"/>
               <a:t>04/10/2022</a:t>
             </a:fld>
-            <a:endParaRPr lang="pt-PT"/>
+            <a:endParaRPr lang="pt-PT" dirty="0"/>
           </a:p>
         </p:txBody>
       </p:sp>
@@ -1978,7 +1983,7 @@
           <a:bodyPr/>
           <a:lstStyle/>
           <a:p>
-            <a:endParaRPr lang="pt-PT"/>
+            <a:endParaRPr lang="pt-PT" dirty="0"/>
           </a:p>
         </p:txBody>
       </p:sp>
@@ -2007,7 +2012,7 @@
               <a:rPr lang="pt-PT" smtClean="0"/>
               <a:t>‹nº›</a:t>
             </a:fld>
-            <a:endParaRPr lang="pt-PT"/>
+            <a:endParaRPr lang="pt-PT" dirty="0"/>
           </a:p>
         </p:txBody>
       </p:sp>
@@ -2066,7 +2071,7 @@
               <a:rPr lang="pt-PT" smtClean="0"/>
               <a:t>04/10/2022</a:t>
             </a:fld>
-            <a:endParaRPr lang="pt-PT"/>
+            <a:endParaRPr lang="pt-PT" dirty="0"/>
           </a:p>
         </p:txBody>
       </p:sp>
@@ -2091,7 +2096,7 @@
           <a:bodyPr/>
           <a:lstStyle/>
           <a:p>
-            <a:endParaRPr lang="pt-PT"/>
+            <a:endParaRPr lang="pt-PT" dirty="0"/>
           </a:p>
         </p:txBody>
       </p:sp>
@@ -2120,7 +2125,7 @@
               <a:rPr lang="pt-PT" smtClean="0"/>
               <a:t>‹nº›</a:t>
             </a:fld>
-            <a:endParaRPr lang="pt-PT"/>
+            <a:endParaRPr lang="pt-PT" dirty="0"/>
           </a:p>
         </p:txBody>
       </p:sp>
@@ -2377,7 +2382,7 @@
               <a:rPr lang="pt-PT" smtClean="0"/>
               <a:t>04/10/2022</a:t>
             </a:fld>
-            <a:endParaRPr lang="pt-PT"/>
+            <a:endParaRPr lang="pt-PT" dirty="0"/>
           </a:p>
         </p:txBody>
       </p:sp>
@@ -2402,7 +2407,7 @@
           <a:bodyPr/>
           <a:lstStyle/>
           <a:p>
-            <a:endParaRPr lang="pt-PT"/>
+            <a:endParaRPr lang="pt-PT" dirty="0"/>
           </a:p>
         </p:txBody>
       </p:sp>
@@ -2431,7 +2436,7 @@
               <a:rPr lang="pt-PT" smtClean="0"/>
               <a:t>‹nº›</a:t>
             </a:fld>
-            <a:endParaRPr lang="pt-PT"/>
+            <a:endParaRPr lang="pt-PT" dirty="0"/>
           </a:p>
         </p:txBody>
       </p:sp>
@@ -2565,7 +2570,7 @@
             </a:lvl9pPr>
           </a:lstStyle>
           <a:p>
-            <a:endParaRPr lang="pt-PT"/>
+            <a:endParaRPr lang="pt-PT" dirty="0"/>
           </a:p>
         </p:txBody>
       </p:sp>
@@ -2665,7 +2670,7 @@
               <a:rPr lang="pt-PT" smtClean="0"/>
               <a:t>04/10/2022</a:t>
             </a:fld>
-            <a:endParaRPr lang="pt-PT"/>
+            <a:endParaRPr lang="pt-PT" dirty="0"/>
           </a:p>
         </p:txBody>
       </p:sp>
@@ -2690,7 +2695,7 @@
           <a:bodyPr/>
           <a:lstStyle/>
           <a:p>
-            <a:endParaRPr lang="pt-PT"/>
+            <a:endParaRPr lang="pt-PT" dirty="0"/>
           </a:p>
         </p:txBody>
       </p:sp>
@@ -2719,7 +2724,7 @@
               <a:rPr lang="pt-PT" smtClean="0"/>
               <a:t>‹nº›</a:t>
             </a:fld>
-            <a:endParaRPr lang="pt-PT"/>
+            <a:endParaRPr lang="pt-PT" dirty="0"/>
           </a:p>
         </p:txBody>
       </p:sp>
@@ -2906,7 +2911,7 @@
               <a:rPr lang="pt-PT" smtClean="0"/>
               <a:t>04/10/2022</a:t>
             </a:fld>
-            <a:endParaRPr lang="pt-PT"/>
+            <a:endParaRPr lang="pt-PT" dirty="0"/>
           </a:p>
         </p:txBody>
       </p:sp>
@@ -2949,7 +2954,7 @@
             </a:lvl1pPr>
           </a:lstStyle>
           <a:p>
-            <a:endParaRPr lang="pt-PT"/>
+            <a:endParaRPr lang="pt-PT" dirty="0"/>
           </a:p>
         </p:txBody>
       </p:sp>
@@ -2996,7 +3001,7 @@
               <a:rPr lang="pt-PT" smtClean="0"/>
               <a:t>‹nº›</a:t>
             </a:fld>
-            <a:endParaRPr lang="pt-PT"/>
+            <a:endParaRPr lang="pt-PT" dirty="0"/>
           </a:p>
         </p:txBody>
       </p:sp>
@@ -3369,12 +3374,12 @@
         <p:spPr>
           <a:xfrm>
             <a:off x="0" y="1981841"/>
-            <a:ext cx="3926048" cy="3521337"/>
+            <a:ext cx="3926048" cy="5073300"/>
           </a:xfrm>
         </p:spPr>
         <p:txBody>
           <a:bodyPr>
-            <a:normAutofit/>
+            <a:normAutofit lnSpcReduction="10000"/>
           </a:bodyPr>
           <a:lstStyle/>
           <a:p>
@@ -3417,7 +3422,7 @@
             </a:pPr>
             <a:r>
               <a:rPr lang="pt-PT" sz="2400" dirty="0"/>
-              <a:t>Utilizador (nome);</a:t>
+              <a:t>Utilizador (nome, foto, email);</a:t>
             </a:r>
           </a:p>
           <a:p>
@@ -3439,6 +3444,33 @@
               <a:rPr lang="pt-PT" sz="2400" dirty="0"/>
               <a:t>Catálogo (categorias);</a:t>
             </a:r>
+          </a:p>
+          <a:p>
+            <a:pPr>
+              <a:buFont typeface="Calibri" panose="020F0502020204030204" pitchFamily="34" charset="0"/>
+              <a:buChar char="⁻"/>
+            </a:pPr>
+            <a:r>
+              <a:rPr lang="pt-PT" sz="2400" dirty="0"/>
+              <a:t>Notificação (mensagem);</a:t>
+            </a:r>
+          </a:p>
+          <a:p>
+            <a:pPr>
+              <a:buFont typeface="Calibri" panose="020F0502020204030204" pitchFamily="34" charset="0"/>
+              <a:buChar char="⁻"/>
+            </a:pPr>
+            <a:r>
+              <a:rPr lang="pt-PT" sz="2400" dirty="0"/>
+              <a:t>Comentários (texto);</a:t>
+            </a:r>
+          </a:p>
+          <a:p>
+            <a:pPr>
+              <a:buFont typeface="Calibri" panose="020F0502020204030204" pitchFamily="34" charset="0"/>
+              <a:buChar char="⁻"/>
+            </a:pPr>
+            <a:endParaRPr lang="pt-PT" sz="2400" dirty="0"/>
           </a:p>
           <a:p>
             <a:pPr marL="0" indent="0">
@@ -3473,13 +3505,13 @@
         </p:nvSpPr>
         <p:spPr>
           <a:xfrm>
-            <a:off x="3640823" y="1981842"/>
-            <a:ext cx="3338817" cy="2564992"/>
+            <a:off x="4068661" y="2008814"/>
+            <a:ext cx="3212982" cy="4400142"/>
           </a:xfrm>
         </p:spPr>
         <p:txBody>
           <a:bodyPr>
-            <a:normAutofit/>
+            <a:normAutofit lnSpcReduction="10000"/>
           </a:bodyPr>
           <a:lstStyle/>
           <a:p>
@@ -3512,7 +3544,7 @@
             </a:pPr>
             <a:r>
               <a:rPr lang="pt-PT" sz="2400" dirty="0"/>
-              <a:t>Selecionar livro;</a:t>
+              <a:t>Selecionar, pesquisar livro;</a:t>
             </a:r>
           </a:p>
           <a:p>
@@ -3532,11 +3564,154 @@
             </a:pPr>
             <a:r>
               <a:rPr lang="pt-PT" sz="2400" dirty="0"/>
-              <a:t>Selecionar utilizador;</a:t>
+              <a:t>Selecionar, pesquisar utilizador;</a:t>
             </a:r>
           </a:p>
           <a:p>
             <a:pPr>
+              <a:buFont typeface="Calibri" panose="020F0502020204030204" pitchFamily="34" charset="0"/>
+              <a:buChar char="⁻"/>
+            </a:pPr>
+            <a:r>
+              <a:rPr lang="pt-PT" sz="2400" dirty="0"/>
+              <a:t>Selecionar, remover notificações;</a:t>
+            </a:r>
+          </a:p>
+          <a:p>
+            <a:pPr>
+              <a:buFont typeface="Calibri" panose="020F0502020204030204" pitchFamily="34" charset="0"/>
+              <a:buChar char="⁻"/>
+            </a:pPr>
+            <a:r>
+              <a:rPr lang="pt-PT" sz="2400" dirty="0"/>
+              <a:t>Criar, editar, remover comentário;</a:t>
+            </a:r>
+          </a:p>
+          <a:p>
+            <a:pPr>
+              <a:buFont typeface="Calibri" panose="020F0502020204030204" pitchFamily="34" charset="0"/>
+              <a:buChar char="⁻"/>
+            </a:pPr>
+            <a:endParaRPr lang="pt-PT" sz="2400" dirty="0"/>
+          </a:p>
+          <a:p>
+            <a:pPr>
+              <a:buFont typeface="Calibri" panose="020F0502020204030204" pitchFamily="34" charset="0"/>
+              <a:buChar char="⁻"/>
+            </a:pPr>
+            <a:endParaRPr lang="pt-PT" sz="2400" dirty="0"/>
+          </a:p>
+        </p:txBody>
+      </p:sp>
+      <p:sp>
+        <p:nvSpPr>
+          <p:cNvPr id="6" name="CaixaDeTexto 5">
+            <a:extLst>
+              <a:ext uri="{FF2B5EF4-FFF2-40B4-BE49-F238E27FC236}">
+                <a16:creationId xmlns:a16="http://schemas.microsoft.com/office/drawing/2014/main" id="{DB808523-C0FB-1165-CE34-3C735B82C123}"/>
+              </a:ext>
+            </a:extLst>
+          </p:cNvPr>
+          <p:cNvSpPr txBox="1"/>
+          <p:nvPr/>
+        </p:nvSpPr>
+        <p:spPr>
+          <a:xfrm>
+            <a:off x="7633982" y="1977530"/>
+            <a:ext cx="4172824" cy="4585871"/>
+          </a:xfrm>
+          <a:prstGeom prst="rect">
+            <a:avLst/>
+          </a:prstGeom>
+          <a:noFill/>
+        </p:spPr>
+        <p:txBody>
+          <a:bodyPr wrap="square" rtlCol="0">
+            <a:spAutoFit/>
+          </a:bodyPr>
+          <a:lstStyle/>
+          <a:p>
+            <a:r>
+              <a:rPr lang="pt-PT" sz="2800" dirty="0">
+                <a:solidFill>
+                  <a:schemeClr val="accent1"/>
+                </a:solidFill>
+              </a:rPr>
+              <a:t>Relações:</a:t>
+            </a:r>
+          </a:p>
+          <a:p>
+            <a:pPr marL="342900" indent="-342900">
+              <a:buFont typeface="Calibri" panose="020F0502020204030204" pitchFamily="34" charset="0"/>
+              <a:buChar char="⁻"/>
+            </a:pPr>
+            <a:r>
+              <a:rPr lang="pt-PT" sz="2400" dirty="0"/>
+              <a:t>Catálogo tem livros;</a:t>
+            </a:r>
+          </a:p>
+          <a:p>
+            <a:pPr marL="342900" indent="-342900">
+              <a:buFont typeface="Calibri" panose="020F0502020204030204" pitchFamily="34" charset="0"/>
+              <a:buChar char="⁻"/>
+            </a:pPr>
+            <a:r>
+              <a:rPr lang="pt-PT" sz="2400" dirty="0"/>
+              <a:t>Biblioteca tem pisos;</a:t>
+            </a:r>
+          </a:p>
+          <a:p>
+            <a:pPr marL="342900" indent="-342900">
+              <a:buFont typeface="Calibri" panose="020F0502020204030204" pitchFamily="34" charset="0"/>
+              <a:buChar char="⁻"/>
+            </a:pPr>
+            <a:r>
+              <a:rPr lang="pt-PT" sz="2400" dirty="0"/>
+              <a:t>Biblioteca tem salas;</a:t>
+            </a:r>
+          </a:p>
+          <a:p>
+            <a:pPr marL="342900" indent="-342900">
+              <a:buFont typeface="Calibri" panose="020F0502020204030204" pitchFamily="34" charset="0"/>
+              <a:buChar char="⁻"/>
+            </a:pPr>
+            <a:r>
+              <a:rPr lang="pt-PT" sz="2400" dirty="0"/>
+              <a:t>Livro tem comentários;</a:t>
+            </a:r>
+          </a:p>
+          <a:p>
+            <a:pPr marL="342900" indent="-342900">
+              <a:buFont typeface="Calibri" panose="020F0502020204030204" pitchFamily="34" charset="0"/>
+              <a:buChar char="⁻"/>
+            </a:pPr>
+            <a:r>
+              <a:rPr lang="pt-PT" sz="2400" dirty="0"/>
+              <a:t>Uma notificação pertence a um utilizador;</a:t>
+            </a:r>
+          </a:p>
+          <a:p>
+            <a:pPr marL="342900" indent="-342900">
+              <a:buFont typeface="Calibri" panose="020F0502020204030204" pitchFamily="34" charset="0"/>
+              <a:buChar char="⁻"/>
+            </a:pPr>
+            <a:r>
+              <a:rPr lang="pt-PT" sz="2400" dirty="0"/>
+              <a:t>Um comentário pertence a um utilizador;</a:t>
+            </a:r>
+          </a:p>
+          <a:p>
+            <a:pPr marL="342900" indent="-342900">
+              <a:buFont typeface="Calibri" panose="020F0502020204030204" pitchFamily="34" charset="0"/>
+              <a:buChar char="⁻"/>
+            </a:pPr>
+            <a:r>
+              <a:rPr lang="pt-PT" sz="2400" dirty="0"/>
+              <a:t>Um utilizador segue vários utilizadores;</a:t>
+            </a:r>
+          </a:p>
+          <a:p>
+            <a:pPr marL="342900" indent="-342900">
               <a:buFont typeface="Calibri" panose="020F0502020204030204" pitchFamily="34" charset="0"/>
               <a:buChar char="⁻"/>
             </a:pPr>

</xml_diff>